<commit_message>
Senior Project Poster upload
</commit_message>
<xml_diff>
--- a/Posters/SeniorProject-Poster.pptx
+++ b/Posters/SeniorProject-Poster.pptx
@@ -233,7 +233,7 @@
             <a:fld id="{AC579C2D-29BE-6948-80B9-138A16B9DF50}" type="datetime1">
               <a:rPr lang="en-US"/>
               <a:pPr/>
-              <a:t>12/2/14</a:t>
+              <a:t>12/3/14</a:t>
             </a:fld>
             <a:endParaRPr lang="en-US"/>
           </a:p>
@@ -4780,7 +4780,7 @@
         </p:nvSpPr>
         <p:spPr bwMode="auto">
           <a:xfrm>
-            <a:off x="914400" y="5486400"/>
+            <a:off x="990600" y="5486400"/>
             <a:ext cx="31089600" cy="35661600"/>
           </a:xfrm>
           <a:prstGeom prst="rect">
@@ -4823,179 +4823,7 @@
           <a:bodyPr wrap="none" anchor="ctr"/>
           <a:lstStyle/>
           <a:p>
-            <a:endParaRPr lang="en-US" dirty="0"/>
-          </a:p>
-        </p:txBody>
-      </p:sp>
-      <p:sp>
-        <p:nvSpPr>
-          <p:cNvPr id="215" name="Text Box 19"/>
-          <p:cNvSpPr txBox="1">
-            <a:spLocks noChangeArrowheads="1"/>
-          </p:cNvSpPr>
-          <p:nvPr/>
-        </p:nvSpPr>
-        <p:spPr bwMode="auto">
-          <a:xfrm>
-            <a:off x="4114800" y="5789613"/>
-            <a:ext cx="5486400" cy="731837"/>
-          </a:xfrm>
-          <a:prstGeom prst="rect">
-            <a:avLst/>
-          </a:prstGeom>
-          <a:solidFill>
-            <a:srgbClr val="B6A674"/>
-          </a:solidFill>
-          <a:ln>
-            <a:headEnd/>
-            <a:tailEnd/>
-          </a:ln>
-        </p:spPr>
-        <p:style>
-          <a:lnRef idx="1">
-            <a:schemeClr val="dk1"/>
-          </a:lnRef>
-          <a:fillRef idx="2">
-            <a:schemeClr val="dk1"/>
-          </a:fillRef>
-          <a:effectRef idx="1">
-            <a:schemeClr val="dk1"/>
-          </a:effectRef>
-          <a:fontRef idx="minor">
-            <a:schemeClr val="dk1"/>
-          </a:fontRef>
-        </p:style>
-        <p:txBody>
-          <a:bodyPr lIns="98655" tIns="49327" rIns="98655" bIns="49327">
-            <a:spAutoFit/>
-          </a:bodyPr>
-          <a:lstStyle>
-            <a:lvl1pPr defTabSz="985838" eaLnBrk="0" hangingPunct="0">
-              <a:defRPr sz="8400">
-                <a:solidFill>
-                  <a:schemeClr val="tx1"/>
-                </a:solidFill>
-                <a:latin typeface="Arial" charset="0"/>
-                <a:ea typeface="ＭＳ Ｐゴシック" charset="0"/>
-                <a:cs typeface="ＭＳ Ｐゴシック" charset="0"/>
-              </a:defRPr>
-            </a:lvl1pPr>
-            <a:lvl2pPr marL="37931725" indent="-37474525" defTabSz="985838" eaLnBrk="0" hangingPunct="0">
-              <a:defRPr sz="8400">
-                <a:solidFill>
-                  <a:schemeClr val="tx1"/>
-                </a:solidFill>
-                <a:latin typeface="Arial" charset="0"/>
-                <a:ea typeface="ＭＳ Ｐゴシック" charset="0"/>
-              </a:defRPr>
-            </a:lvl2pPr>
-            <a:lvl3pPr eaLnBrk="0" hangingPunct="0">
-              <a:defRPr sz="8400">
-                <a:solidFill>
-                  <a:schemeClr val="tx1"/>
-                </a:solidFill>
-                <a:latin typeface="Arial" charset="0"/>
-                <a:ea typeface="ＭＳ Ｐゴシック" charset="0"/>
-              </a:defRPr>
-            </a:lvl3pPr>
-            <a:lvl4pPr eaLnBrk="0" hangingPunct="0">
-              <a:defRPr sz="8400">
-                <a:solidFill>
-                  <a:schemeClr val="tx1"/>
-                </a:solidFill>
-                <a:latin typeface="Arial" charset="0"/>
-                <a:ea typeface="ＭＳ Ｐゴシック" charset="0"/>
-              </a:defRPr>
-            </a:lvl4pPr>
-            <a:lvl5pPr eaLnBrk="0" hangingPunct="0">
-              <a:defRPr sz="8400">
-                <a:solidFill>
-                  <a:schemeClr val="tx1"/>
-                </a:solidFill>
-                <a:latin typeface="Arial" charset="0"/>
-                <a:ea typeface="ＭＳ Ｐゴシック" charset="0"/>
-              </a:defRPr>
-            </a:lvl5pPr>
-            <a:lvl6pPr marL="457200" eaLnBrk="0" fontAlgn="base" hangingPunct="0">
-              <a:spcBef>
-                <a:spcPct val="0"/>
-              </a:spcBef>
-              <a:spcAft>
-                <a:spcPct val="0"/>
-              </a:spcAft>
-              <a:defRPr sz="8400">
-                <a:solidFill>
-                  <a:schemeClr val="tx1"/>
-                </a:solidFill>
-                <a:latin typeface="Arial" charset="0"/>
-                <a:ea typeface="ＭＳ Ｐゴシック" charset="0"/>
-              </a:defRPr>
-            </a:lvl6pPr>
-            <a:lvl7pPr marL="914400" eaLnBrk="0" fontAlgn="base" hangingPunct="0">
-              <a:spcBef>
-                <a:spcPct val="0"/>
-              </a:spcBef>
-              <a:spcAft>
-                <a:spcPct val="0"/>
-              </a:spcAft>
-              <a:defRPr sz="8400">
-                <a:solidFill>
-                  <a:schemeClr val="tx1"/>
-                </a:solidFill>
-                <a:latin typeface="Arial" charset="0"/>
-                <a:ea typeface="ＭＳ Ｐゴシック" charset="0"/>
-              </a:defRPr>
-            </a:lvl7pPr>
-            <a:lvl8pPr marL="1371600" eaLnBrk="0" fontAlgn="base" hangingPunct="0">
-              <a:spcBef>
-                <a:spcPct val="0"/>
-              </a:spcBef>
-              <a:spcAft>
-                <a:spcPct val="0"/>
-              </a:spcAft>
-              <a:defRPr sz="8400">
-                <a:solidFill>
-                  <a:schemeClr val="tx1"/>
-                </a:solidFill>
-                <a:latin typeface="Arial" charset="0"/>
-                <a:ea typeface="ＭＳ Ｐゴシック" charset="0"/>
-              </a:defRPr>
-            </a:lvl8pPr>
-            <a:lvl9pPr marL="1828800" eaLnBrk="0" fontAlgn="base" hangingPunct="0">
-              <a:spcBef>
-                <a:spcPct val="0"/>
-              </a:spcBef>
-              <a:spcAft>
-                <a:spcPct val="0"/>
-              </a:spcAft>
-              <a:defRPr sz="8400">
-                <a:solidFill>
-                  <a:schemeClr val="tx1"/>
-                </a:solidFill>
-                <a:latin typeface="Arial" charset="0"/>
-                <a:ea typeface="ＭＳ Ｐゴシック" charset="0"/>
-              </a:defRPr>
-            </a:lvl9pPr>
-          </a:lstStyle>
-          <a:p>
-            <a:pPr algn="ctr" eaLnBrk="1" hangingPunct="1">
-              <a:spcBef>
-                <a:spcPct val="50000"/>
-              </a:spcBef>
-            </a:pPr>
-            <a:r>
-              <a:rPr lang="en-US" sz="4100" b="1" dirty="0">
-                <a:solidFill>
-                  <a:srgbClr val="1B390A"/>
-                </a:solidFill>
-                <a:effectLst>
-                  <a:outerShdw blurRad="38100" dist="38100" dir="2700000" algn="tl">
-                    <a:srgbClr val="DDDDDD"/>
-                  </a:outerShdw>
-                </a:effectLst>
-              </a:rPr>
-              <a:t>Problem</a:t>
-            </a:r>
+            <a:endParaRPr lang="en-US" sz="2500" dirty="0"/>
           </a:p>
         </p:txBody>
       </p:sp>
@@ -5262,7 +5090,7 @@
           <p:nvPr/>
         </p:nvPicPr>
         <p:blipFill>
-          <a:blip r:embed="rId3">
+          <a:blip r:embed="rId4">
             <a:extLst>
               <a:ext uri="{28A0092B-C50C-407E-A947-70E740481C1C}">
                 <a14:useLocalDpi xmlns:a14="http://schemas.microsoft.com/office/drawing/2010/main" val="0"/>
@@ -5317,7 +5145,7 @@
         </p:nvSpPr>
         <p:spPr bwMode="auto">
           <a:xfrm>
-            <a:off x="13716000" y="5792788"/>
+            <a:off x="13639800" y="5973763"/>
             <a:ext cx="5486400" cy="731837"/>
           </a:xfrm>
           <a:prstGeom prst="rect">
@@ -5489,7 +5317,7 @@
         </p:nvSpPr>
         <p:spPr bwMode="auto">
           <a:xfrm>
-            <a:off x="23317200" y="5792788"/>
+            <a:off x="23393400" y="5973763"/>
             <a:ext cx="5486400" cy="731837"/>
           </a:xfrm>
           <a:prstGeom prst="rect">
@@ -5653,7 +5481,7 @@
       </p:sp>
       <p:sp>
         <p:nvSpPr>
-          <p:cNvPr id="36" name="Text Box 19"/>
+          <p:cNvPr id="37" name="Text Box 19"/>
           <p:cNvSpPr txBox="1">
             <a:spLocks noChangeArrowheads="1"/>
           </p:cNvSpPr>
@@ -5661,7 +5489,7 @@
         </p:nvSpPr>
         <p:spPr bwMode="auto">
           <a:xfrm>
-            <a:off x="4114800" y="17373600"/>
+            <a:off x="3505200" y="18745200"/>
             <a:ext cx="5486400" cy="731838"/>
           </a:xfrm>
           <a:prstGeom prst="rect">
@@ -5818,14 +5646,14 @@
                   </a:outerShdw>
                 </a:effectLst>
               </a:rPr>
-              <a:t>System Design</a:t>
-            </a:r>
-          </a:p>
-        </p:txBody>
-      </p:sp>
-      <p:sp>
-        <p:nvSpPr>
-          <p:cNvPr id="37" name="Text Box 19"/>
+              <a:t>Object Design</a:t>
+            </a:r>
+          </a:p>
+        </p:txBody>
+      </p:sp>
+      <p:sp>
+        <p:nvSpPr>
+          <p:cNvPr id="39" name="Text Box 19"/>
           <p:cNvSpPr txBox="1">
             <a:spLocks noChangeArrowheads="1"/>
           </p:cNvSpPr>
@@ -5833,7 +5661,7 @@
         </p:nvSpPr>
         <p:spPr bwMode="auto">
           <a:xfrm>
-            <a:off x="13716000" y="17373600"/>
+            <a:off x="23850600" y="18592800"/>
             <a:ext cx="5486400" cy="731838"/>
           </a:xfrm>
           <a:prstGeom prst="rect">
@@ -5990,14 +5818,14 @@
                   </a:outerShdw>
                 </a:effectLst>
               </a:rPr>
-              <a:t>Object Design</a:t>
-            </a:r>
-          </a:p>
-        </p:txBody>
-      </p:sp>
-      <p:sp>
-        <p:nvSpPr>
-          <p:cNvPr id="38" name="Text Box 19"/>
+              <a:t>Verification</a:t>
+            </a:r>
+          </a:p>
+        </p:txBody>
+      </p:sp>
+      <p:sp>
+        <p:nvSpPr>
+          <p:cNvPr id="40" name="Text Box 19"/>
           <p:cNvSpPr txBox="1">
             <a:spLocks noChangeArrowheads="1"/>
           </p:cNvSpPr>
@@ -6005,7 +5833,7 @@
         </p:nvSpPr>
         <p:spPr bwMode="auto">
           <a:xfrm>
-            <a:off x="23317200" y="17373600"/>
+            <a:off x="23850600" y="30510162"/>
             <a:ext cx="5486400" cy="731838"/>
           </a:xfrm>
           <a:prstGeom prst="rect">
@@ -6162,14 +5990,14 @@
                   </a:outerShdw>
                 </a:effectLst>
               </a:rPr>
-              <a:t>Implementation</a:t>
-            </a:r>
-          </a:p>
-        </p:txBody>
-      </p:sp>
-      <p:sp>
-        <p:nvSpPr>
-          <p:cNvPr id="39" name="Text Box 19"/>
+              <a:t>Screenshots</a:t>
+            </a:r>
+          </a:p>
+        </p:txBody>
+      </p:sp>
+      <p:sp>
+        <p:nvSpPr>
+          <p:cNvPr id="41" name="Text Box 19"/>
           <p:cNvSpPr txBox="1">
             <a:spLocks noChangeArrowheads="1"/>
           </p:cNvSpPr>
@@ -6177,7 +6005,7 @@
         </p:nvSpPr>
         <p:spPr bwMode="auto">
           <a:xfrm>
-            <a:off x="4114800" y="29260800"/>
+            <a:off x="3505200" y="30662562"/>
             <a:ext cx="5486400" cy="731838"/>
           </a:xfrm>
           <a:prstGeom prst="rect">
@@ -6334,350 +6162,6 @@
                   </a:outerShdw>
                 </a:effectLst>
               </a:rPr>
-              <a:t>Verification</a:t>
-            </a:r>
-          </a:p>
-        </p:txBody>
-      </p:sp>
-      <p:sp>
-        <p:nvSpPr>
-          <p:cNvPr id="40" name="Text Box 19"/>
-          <p:cNvSpPr txBox="1">
-            <a:spLocks noChangeArrowheads="1"/>
-          </p:cNvSpPr>
-          <p:nvPr/>
-        </p:nvSpPr>
-        <p:spPr bwMode="auto">
-          <a:xfrm>
-            <a:off x="13716000" y="29260800"/>
-            <a:ext cx="5486400" cy="731838"/>
-          </a:xfrm>
-          <a:prstGeom prst="rect">
-            <a:avLst/>
-          </a:prstGeom>
-          <a:solidFill>
-            <a:srgbClr val="B6A674"/>
-          </a:solidFill>
-          <a:ln>
-            <a:headEnd/>
-            <a:tailEnd/>
-          </a:ln>
-        </p:spPr>
-        <p:style>
-          <a:lnRef idx="1">
-            <a:schemeClr val="dk1"/>
-          </a:lnRef>
-          <a:fillRef idx="2">
-            <a:schemeClr val="dk1"/>
-          </a:fillRef>
-          <a:effectRef idx="1">
-            <a:schemeClr val="dk1"/>
-          </a:effectRef>
-          <a:fontRef idx="minor">
-            <a:schemeClr val="dk1"/>
-          </a:fontRef>
-        </p:style>
-        <p:txBody>
-          <a:bodyPr lIns="98655" tIns="49327" rIns="98655" bIns="49327">
-            <a:spAutoFit/>
-          </a:bodyPr>
-          <a:lstStyle>
-            <a:lvl1pPr defTabSz="985838" eaLnBrk="0" hangingPunct="0">
-              <a:defRPr sz="8400">
-                <a:solidFill>
-                  <a:schemeClr val="tx1"/>
-                </a:solidFill>
-                <a:latin typeface="Arial" charset="0"/>
-                <a:ea typeface="ＭＳ Ｐゴシック" charset="0"/>
-                <a:cs typeface="ＭＳ Ｐゴシック" charset="0"/>
-              </a:defRPr>
-            </a:lvl1pPr>
-            <a:lvl2pPr marL="37931725" indent="-37474525" defTabSz="985838" eaLnBrk="0" hangingPunct="0">
-              <a:defRPr sz="8400">
-                <a:solidFill>
-                  <a:schemeClr val="tx1"/>
-                </a:solidFill>
-                <a:latin typeface="Arial" charset="0"/>
-                <a:ea typeface="ＭＳ Ｐゴシック" charset="0"/>
-              </a:defRPr>
-            </a:lvl2pPr>
-            <a:lvl3pPr eaLnBrk="0" hangingPunct="0">
-              <a:defRPr sz="8400">
-                <a:solidFill>
-                  <a:schemeClr val="tx1"/>
-                </a:solidFill>
-                <a:latin typeface="Arial" charset="0"/>
-                <a:ea typeface="ＭＳ Ｐゴシック" charset="0"/>
-              </a:defRPr>
-            </a:lvl3pPr>
-            <a:lvl4pPr eaLnBrk="0" hangingPunct="0">
-              <a:defRPr sz="8400">
-                <a:solidFill>
-                  <a:schemeClr val="tx1"/>
-                </a:solidFill>
-                <a:latin typeface="Arial" charset="0"/>
-                <a:ea typeface="ＭＳ Ｐゴシック" charset="0"/>
-              </a:defRPr>
-            </a:lvl4pPr>
-            <a:lvl5pPr eaLnBrk="0" hangingPunct="0">
-              <a:defRPr sz="8400">
-                <a:solidFill>
-                  <a:schemeClr val="tx1"/>
-                </a:solidFill>
-                <a:latin typeface="Arial" charset="0"/>
-                <a:ea typeface="ＭＳ Ｐゴシック" charset="0"/>
-              </a:defRPr>
-            </a:lvl5pPr>
-            <a:lvl6pPr marL="457200" eaLnBrk="0" fontAlgn="base" hangingPunct="0">
-              <a:spcBef>
-                <a:spcPct val="0"/>
-              </a:spcBef>
-              <a:spcAft>
-                <a:spcPct val="0"/>
-              </a:spcAft>
-              <a:defRPr sz="8400">
-                <a:solidFill>
-                  <a:schemeClr val="tx1"/>
-                </a:solidFill>
-                <a:latin typeface="Arial" charset="0"/>
-                <a:ea typeface="ＭＳ Ｐゴシック" charset="0"/>
-              </a:defRPr>
-            </a:lvl6pPr>
-            <a:lvl7pPr marL="914400" eaLnBrk="0" fontAlgn="base" hangingPunct="0">
-              <a:spcBef>
-                <a:spcPct val="0"/>
-              </a:spcBef>
-              <a:spcAft>
-                <a:spcPct val="0"/>
-              </a:spcAft>
-              <a:defRPr sz="8400">
-                <a:solidFill>
-                  <a:schemeClr val="tx1"/>
-                </a:solidFill>
-                <a:latin typeface="Arial" charset="0"/>
-                <a:ea typeface="ＭＳ Ｐゴシック" charset="0"/>
-              </a:defRPr>
-            </a:lvl7pPr>
-            <a:lvl8pPr marL="1371600" eaLnBrk="0" fontAlgn="base" hangingPunct="0">
-              <a:spcBef>
-                <a:spcPct val="0"/>
-              </a:spcBef>
-              <a:spcAft>
-                <a:spcPct val="0"/>
-              </a:spcAft>
-              <a:defRPr sz="8400">
-                <a:solidFill>
-                  <a:schemeClr val="tx1"/>
-                </a:solidFill>
-                <a:latin typeface="Arial" charset="0"/>
-                <a:ea typeface="ＭＳ Ｐゴシック" charset="0"/>
-              </a:defRPr>
-            </a:lvl8pPr>
-            <a:lvl9pPr marL="1828800" eaLnBrk="0" fontAlgn="base" hangingPunct="0">
-              <a:spcBef>
-                <a:spcPct val="0"/>
-              </a:spcBef>
-              <a:spcAft>
-                <a:spcPct val="0"/>
-              </a:spcAft>
-              <a:defRPr sz="8400">
-                <a:solidFill>
-                  <a:schemeClr val="tx1"/>
-                </a:solidFill>
-                <a:latin typeface="Arial" charset="0"/>
-                <a:ea typeface="ＭＳ Ｐゴシック" charset="0"/>
-              </a:defRPr>
-            </a:lvl9pPr>
-          </a:lstStyle>
-          <a:p>
-            <a:pPr algn="ctr" eaLnBrk="1" hangingPunct="1">
-              <a:spcBef>
-                <a:spcPct val="50000"/>
-              </a:spcBef>
-            </a:pPr>
-            <a:r>
-              <a:rPr lang="en-US" sz="4100" b="1" dirty="0">
-                <a:solidFill>
-                  <a:srgbClr val="1B390A"/>
-                </a:solidFill>
-                <a:effectLst>
-                  <a:outerShdw blurRad="38100" dist="38100" dir="2700000" algn="tl">
-                    <a:srgbClr val="DDDDDD"/>
-                  </a:outerShdw>
-                </a:effectLst>
-              </a:rPr>
-              <a:t>Screenshots</a:t>
-            </a:r>
-          </a:p>
-        </p:txBody>
-      </p:sp>
-      <p:sp>
-        <p:nvSpPr>
-          <p:cNvPr id="41" name="Text Box 19"/>
-          <p:cNvSpPr txBox="1">
-            <a:spLocks noChangeArrowheads="1"/>
-          </p:cNvSpPr>
-          <p:nvPr/>
-        </p:nvSpPr>
-        <p:spPr bwMode="auto">
-          <a:xfrm>
-            <a:off x="23317200" y="29260800"/>
-            <a:ext cx="5486400" cy="731838"/>
-          </a:xfrm>
-          <a:prstGeom prst="rect">
-            <a:avLst/>
-          </a:prstGeom>
-          <a:solidFill>
-            <a:srgbClr val="B6A674"/>
-          </a:solidFill>
-          <a:ln>
-            <a:headEnd/>
-            <a:tailEnd/>
-          </a:ln>
-        </p:spPr>
-        <p:style>
-          <a:lnRef idx="1">
-            <a:schemeClr val="dk1"/>
-          </a:lnRef>
-          <a:fillRef idx="2">
-            <a:schemeClr val="dk1"/>
-          </a:fillRef>
-          <a:effectRef idx="1">
-            <a:schemeClr val="dk1"/>
-          </a:effectRef>
-          <a:fontRef idx="minor">
-            <a:schemeClr val="dk1"/>
-          </a:fontRef>
-        </p:style>
-        <p:txBody>
-          <a:bodyPr lIns="98655" tIns="49327" rIns="98655" bIns="49327">
-            <a:spAutoFit/>
-          </a:bodyPr>
-          <a:lstStyle>
-            <a:lvl1pPr defTabSz="985838" eaLnBrk="0" hangingPunct="0">
-              <a:defRPr sz="8400">
-                <a:solidFill>
-                  <a:schemeClr val="tx1"/>
-                </a:solidFill>
-                <a:latin typeface="Arial" charset="0"/>
-                <a:ea typeface="ＭＳ Ｐゴシック" charset="0"/>
-                <a:cs typeface="ＭＳ Ｐゴシック" charset="0"/>
-              </a:defRPr>
-            </a:lvl1pPr>
-            <a:lvl2pPr marL="37931725" indent="-37474525" defTabSz="985838" eaLnBrk="0" hangingPunct="0">
-              <a:defRPr sz="8400">
-                <a:solidFill>
-                  <a:schemeClr val="tx1"/>
-                </a:solidFill>
-                <a:latin typeface="Arial" charset="0"/>
-                <a:ea typeface="ＭＳ Ｐゴシック" charset="0"/>
-              </a:defRPr>
-            </a:lvl2pPr>
-            <a:lvl3pPr eaLnBrk="0" hangingPunct="0">
-              <a:defRPr sz="8400">
-                <a:solidFill>
-                  <a:schemeClr val="tx1"/>
-                </a:solidFill>
-                <a:latin typeface="Arial" charset="0"/>
-                <a:ea typeface="ＭＳ Ｐゴシック" charset="0"/>
-              </a:defRPr>
-            </a:lvl3pPr>
-            <a:lvl4pPr eaLnBrk="0" hangingPunct="0">
-              <a:defRPr sz="8400">
-                <a:solidFill>
-                  <a:schemeClr val="tx1"/>
-                </a:solidFill>
-                <a:latin typeface="Arial" charset="0"/>
-                <a:ea typeface="ＭＳ Ｐゴシック" charset="0"/>
-              </a:defRPr>
-            </a:lvl4pPr>
-            <a:lvl5pPr eaLnBrk="0" hangingPunct="0">
-              <a:defRPr sz="8400">
-                <a:solidFill>
-                  <a:schemeClr val="tx1"/>
-                </a:solidFill>
-                <a:latin typeface="Arial" charset="0"/>
-                <a:ea typeface="ＭＳ Ｐゴシック" charset="0"/>
-              </a:defRPr>
-            </a:lvl5pPr>
-            <a:lvl6pPr marL="457200" eaLnBrk="0" fontAlgn="base" hangingPunct="0">
-              <a:spcBef>
-                <a:spcPct val="0"/>
-              </a:spcBef>
-              <a:spcAft>
-                <a:spcPct val="0"/>
-              </a:spcAft>
-              <a:defRPr sz="8400">
-                <a:solidFill>
-                  <a:schemeClr val="tx1"/>
-                </a:solidFill>
-                <a:latin typeface="Arial" charset="0"/>
-                <a:ea typeface="ＭＳ Ｐゴシック" charset="0"/>
-              </a:defRPr>
-            </a:lvl6pPr>
-            <a:lvl7pPr marL="914400" eaLnBrk="0" fontAlgn="base" hangingPunct="0">
-              <a:spcBef>
-                <a:spcPct val="0"/>
-              </a:spcBef>
-              <a:spcAft>
-                <a:spcPct val="0"/>
-              </a:spcAft>
-              <a:defRPr sz="8400">
-                <a:solidFill>
-                  <a:schemeClr val="tx1"/>
-                </a:solidFill>
-                <a:latin typeface="Arial" charset="0"/>
-                <a:ea typeface="ＭＳ Ｐゴシック" charset="0"/>
-              </a:defRPr>
-            </a:lvl7pPr>
-            <a:lvl8pPr marL="1371600" eaLnBrk="0" fontAlgn="base" hangingPunct="0">
-              <a:spcBef>
-                <a:spcPct val="0"/>
-              </a:spcBef>
-              <a:spcAft>
-                <a:spcPct val="0"/>
-              </a:spcAft>
-              <a:defRPr sz="8400">
-                <a:solidFill>
-                  <a:schemeClr val="tx1"/>
-                </a:solidFill>
-                <a:latin typeface="Arial" charset="0"/>
-                <a:ea typeface="ＭＳ Ｐゴシック" charset="0"/>
-              </a:defRPr>
-            </a:lvl8pPr>
-            <a:lvl9pPr marL="1828800" eaLnBrk="0" fontAlgn="base" hangingPunct="0">
-              <a:spcBef>
-                <a:spcPct val="0"/>
-              </a:spcBef>
-              <a:spcAft>
-                <a:spcPct val="0"/>
-              </a:spcAft>
-              <a:defRPr sz="8400">
-                <a:solidFill>
-                  <a:schemeClr val="tx1"/>
-                </a:solidFill>
-                <a:latin typeface="Arial" charset="0"/>
-                <a:ea typeface="ＭＳ Ｐゴシック" charset="0"/>
-              </a:defRPr>
-            </a:lvl9pPr>
-          </a:lstStyle>
-          <a:p>
-            <a:pPr algn="ctr" eaLnBrk="1" hangingPunct="1">
-              <a:spcBef>
-                <a:spcPct val="50000"/>
-              </a:spcBef>
-            </a:pPr>
-            <a:r>
-              <a:rPr lang="en-US" sz="4100" b="1" dirty="0">
-                <a:solidFill>
-                  <a:srgbClr val="1B390A"/>
-                </a:solidFill>
-                <a:effectLst>
-                  <a:outerShdw blurRad="38100" dist="38100" dir="2700000" algn="tl">
-                    <a:srgbClr val="DDDDDD"/>
-                  </a:outerShdw>
-                </a:effectLst>
-              </a:rPr>
               <a:t>Summary</a:t>
             </a:r>
           </a:p>
@@ -6712,36 +6196,6 @@
       <p:pic>
         <p:nvPicPr>
           <p:cNvPr id="3" name="Picture 2" descr="google-maps-logo.jpg"/>
-          <p:cNvPicPr>
-            <a:picLocks noChangeAspect="1"/>
-          </p:cNvPicPr>
-          <p:nvPr/>
-        </p:nvPicPr>
-        <p:blipFill>
-          <a:blip r:embed="rId4">
-            <a:extLst>
-              <a:ext uri="{28A0092B-C50C-407E-A947-70E740481C1C}">
-                <a14:useLocalDpi xmlns:a14="http://schemas.microsoft.com/office/drawing/2010/main" val="0"/>
-              </a:ext>
-            </a:extLst>
-          </a:blip>
-          <a:stretch>
-            <a:fillRect/>
-          </a:stretch>
-        </p:blipFill>
-        <p:spPr>
-          <a:xfrm>
-            <a:off x="24765000" y="609600"/>
-            <a:ext cx="2514600" cy="2514600"/>
-          </a:xfrm>
-          <a:prstGeom prst="rect">
-            <a:avLst/>
-          </a:prstGeom>
-        </p:spPr>
-      </p:pic>
-      <p:pic>
-        <p:nvPicPr>
-          <p:cNvPr id="4" name="Picture 3" descr="Javascript_logo_unofficial-300x300.png"/>
           <p:cNvPicPr>
             <a:picLocks noChangeAspect="1"/>
           </p:cNvPicPr>
@@ -6761,8 +6215,8 @@
         </p:blipFill>
         <p:spPr>
           <a:xfrm>
-            <a:off x="5410200" y="2133600"/>
-            <a:ext cx="2895600" cy="2895600"/>
+            <a:off x="24765000" y="609600"/>
+            <a:ext cx="2514600" cy="2514600"/>
           </a:xfrm>
           <a:prstGeom prst="rect">
             <a:avLst/>
@@ -6771,7 +6225,7 @@
       </p:pic>
       <p:pic>
         <p:nvPicPr>
-          <p:cNvPr id="5" name="Picture 4" descr="mysql-logo[1].png"/>
+          <p:cNvPr id="4" name="Picture 3" descr="Javascript_logo_unofficial-300x300.png"/>
           <p:cNvPicPr>
             <a:picLocks noChangeAspect="1"/>
           </p:cNvPicPr>
@@ -6791,8 +6245,8 @@
         </p:blipFill>
         <p:spPr>
           <a:xfrm>
-            <a:off x="25831800" y="2590800"/>
-            <a:ext cx="4789714" cy="2514600"/>
+            <a:off x="5410200" y="2133600"/>
+            <a:ext cx="2895600" cy="2895600"/>
           </a:xfrm>
           <a:prstGeom prst="rect">
             <a:avLst/>
@@ -6801,7 +6255,7 @@
       </p:pic>
       <p:pic>
         <p:nvPicPr>
-          <p:cNvPr id="9" name="Picture 8" descr="ShowImage.png"/>
+          <p:cNvPr id="5" name="Picture 4" descr="mysql-logo[1].png"/>
           <p:cNvPicPr>
             <a:picLocks noChangeAspect="1"/>
           </p:cNvPicPr>
@@ -6821,8 +6275,8 @@
         </p:blipFill>
         <p:spPr>
           <a:xfrm>
-            <a:off x="381000" y="381000"/>
-            <a:ext cx="4038600" cy="3998214"/>
+            <a:off x="25831800" y="2590800"/>
+            <a:ext cx="4789714" cy="2514600"/>
           </a:xfrm>
           <a:prstGeom prst="rect">
             <a:avLst/>
@@ -6831,7 +6285,7 @@
       </p:pic>
       <p:pic>
         <p:nvPicPr>
-          <p:cNvPr id="10" name="Picture 9" descr="sencha-touch-logo-tizen-experts.png"/>
+          <p:cNvPr id="9" name="Picture 8" descr="ShowImage.png"/>
           <p:cNvPicPr>
             <a:picLocks noChangeAspect="1"/>
           </p:cNvPicPr>
@@ -6851,8 +6305,8 @@
         </p:blipFill>
         <p:spPr>
           <a:xfrm>
-            <a:off x="4419600" y="304800"/>
-            <a:ext cx="5080000" cy="2120900"/>
+            <a:off x="381000" y="381000"/>
+            <a:ext cx="4038600" cy="3998214"/>
           </a:xfrm>
           <a:prstGeom prst="rect">
             <a:avLst/>
@@ -6861,7 +6315,7 @@
       </p:pic>
       <p:pic>
         <p:nvPicPr>
-          <p:cNvPr id="11" name="Picture 10" descr="spring-tool-suite-project-logo.png"/>
+          <p:cNvPr id="10" name="Picture 9" descr="sencha-touch-logo-tizen-experts.png"/>
           <p:cNvPicPr>
             <a:picLocks noChangeAspect="1"/>
           </p:cNvPicPr>
@@ -6881,6 +6335,36 @@
         </p:blipFill>
         <p:spPr>
           <a:xfrm>
+            <a:off x="4419600" y="304800"/>
+            <a:ext cx="5080000" cy="2120900"/>
+          </a:xfrm>
+          <a:prstGeom prst="rect">
+            <a:avLst/>
+          </a:prstGeom>
+        </p:spPr>
+      </p:pic>
+      <p:pic>
+        <p:nvPicPr>
+          <p:cNvPr id="11" name="Picture 10" descr="spring-tool-suite-project-logo.png"/>
+          <p:cNvPicPr>
+            <a:picLocks noChangeAspect="1"/>
+          </p:cNvPicPr>
+          <p:nvPr/>
+        </p:nvPicPr>
+        <p:blipFill>
+          <a:blip r:embed="rId10">
+            <a:extLst>
+              <a:ext uri="{28A0092B-C50C-407E-A947-70E740481C1C}">
+                <a14:useLocalDpi xmlns:a14="http://schemas.microsoft.com/office/drawing/2010/main" val="0"/>
+              </a:ext>
+            </a:extLst>
+          </a:blip>
+          <a:stretch>
+            <a:fillRect/>
+          </a:stretch>
+        </p:blipFill>
+        <p:spPr>
+          <a:xfrm>
             <a:off x="29337000" y="381000"/>
             <a:ext cx="2717800" cy="3009900"/>
           </a:xfrm>
@@ -6891,6 +6375,507 @@
       </p:pic>
       <p:sp>
         <p:nvSpPr>
+          <p:cNvPr id="8" name="TextBox 7"/>
+          <p:cNvSpPr txBox="1"/>
+          <p:nvPr/>
+        </p:nvSpPr>
+        <p:spPr>
+          <a:xfrm>
+            <a:off x="1524000" y="31996350"/>
+            <a:ext cx="9753600" cy="7094250"/>
+          </a:xfrm>
+          <a:prstGeom prst="rect">
+            <a:avLst/>
+          </a:prstGeom>
+          <a:noFill/>
+        </p:spPr>
+        <p:txBody>
+          <a:bodyPr wrap="square" rtlCol="0">
+            <a:spAutoFit/>
+          </a:bodyPr>
+          <a:lstStyle/>
+          <a:p>
+            <a:r>
+              <a:rPr lang="en-US" sz="3500" dirty="0" smtClean="0"/>
+              <a:t>After all the work that was implemented for this project, the application can </a:t>
+            </a:r>
+            <a:r>
+              <a:rPr lang="en-US" sz="3500" dirty="0" smtClean="0"/>
+              <a:t>now</a:t>
+            </a:r>
+          </a:p>
+          <a:p>
+            <a:r>
+              <a:rPr lang="en-US" sz="3500" dirty="0" smtClean="0"/>
+              <a:t>be used for tracking the Pinecrest People Mover bus, show all stops, and estimate arrival time for the bus to a stop. </a:t>
+            </a:r>
+            <a:br>
+              <a:rPr lang="en-US" sz="3500" dirty="0" smtClean="0"/>
+            </a:br>
+            <a:r>
+              <a:rPr lang="en-US" sz="3500" dirty="0" smtClean="0"/>
+              <a:t/>
+            </a:r>
+            <a:br>
+              <a:rPr lang="en-US" sz="3500" dirty="0" smtClean="0"/>
+            </a:br>
+            <a:r>
+              <a:rPr lang="en-US" sz="3500" dirty="0" smtClean="0"/>
+              <a:t>With the help of Maurice </a:t>
+            </a:r>
+            <a:r>
+              <a:rPr lang="en-US" sz="3500" dirty="0" err="1" smtClean="0"/>
+              <a:t>Pruna</a:t>
+            </a:r>
+            <a:r>
+              <a:rPr lang="en-US" sz="3500" dirty="0" smtClean="0"/>
+              <a:t>, who was mainly in charge of the back end, the application will only have a 10 second delay when information is being updated. </a:t>
+            </a:r>
+            <a:br>
+              <a:rPr lang="en-US" sz="3500" dirty="0" smtClean="0"/>
+            </a:br>
+            <a:r>
+              <a:rPr lang="en-US" sz="3500" dirty="0" smtClean="0"/>
+              <a:t/>
+            </a:r>
+            <a:br>
+              <a:rPr lang="en-US" sz="3500" dirty="0" smtClean="0"/>
+            </a:br>
+            <a:r>
+              <a:rPr lang="en-US" sz="3500" dirty="0" smtClean="0"/>
+              <a:t>The application is compatible with both web and mobile devices.</a:t>
+            </a:r>
+            <a:endParaRPr lang="en-US" sz="3500" dirty="0"/>
+          </a:p>
+        </p:txBody>
+      </p:sp>
+      <p:sp>
+        <p:nvSpPr>
+          <p:cNvPr id="18" name="TextBox 17"/>
+          <p:cNvSpPr txBox="1"/>
+          <p:nvPr/>
+        </p:nvSpPr>
+        <p:spPr>
+          <a:xfrm>
+            <a:off x="22326600" y="23850600"/>
+            <a:ext cx="9372600" cy="5478423"/>
+          </a:xfrm>
+          <a:prstGeom prst="rect">
+            <a:avLst/>
+          </a:prstGeom>
+          <a:noFill/>
+        </p:spPr>
+        <p:txBody>
+          <a:bodyPr wrap="square" rtlCol="0">
+            <a:spAutoFit/>
+          </a:bodyPr>
+          <a:lstStyle/>
+          <a:p>
+            <a:r>
+              <a:rPr lang="en-US" sz="3500" dirty="0" smtClean="0"/>
+              <a:t>Testing for this project was divided into two sections: system testing and integration testing. Above is an example of a system test case.</a:t>
+            </a:r>
+            <a:br>
+              <a:rPr lang="en-US" sz="3500" dirty="0" smtClean="0"/>
+            </a:br>
+            <a:endParaRPr lang="en-US" sz="3500" dirty="0"/>
+          </a:p>
+          <a:p>
+            <a:r>
+              <a:rPr lang="en-US" sz="3500" b="1" dirty="0" smtClean="0"/>
+              <a:t>System Testing </a:t>
+            </a:r>
+            <a:r>
+              <a:rPr lang="en-US" sz="3500" dirty="0" smtClean="0"/>
+              <a:t>– Dealt with the overall interaction of the user with the system, which was done manually. For each requirement, 3 test cases were completed, two sunny day and one rainy day</a:t>
+            </a:r>
+          </a:p>
+        </p:txBody>
+      </p:sp>
+      <p:sp>
+        <p:nvSpPr>
+          <p:cNvPr id="215" name="Text Box 19"/>
+          <p:cNvSpPr txBox="1">
+            <a:spLocks noChangeArrowheads="1"/>
+          </p:cNvSpPr>
+          <p:nvPr/>
+        </p:nvSpPr>
+        <p:spPr bwMode="auto">
+          <a:xfrm>
+            <a:off x="4114800" y="5973763"/>
+            <a:ext cx="5486400" cy="731837"/>
+          </a:xfrm>
+          <a:prstGeom prst="rect">
+            <a:avLst/>
+          </a:prstGeom>
+          <a:solidFill>
+            <a:srgbClr val="B6A674"/>
+          </a:solidFill>
+          <a:ln>
+            <a:headEnd/>
+            <a:tailEnd/>
+          </a:ln>
+        </p:spPr>
+        <p:style>
+          <a:lnRef idx="1">
+            <a:schemeClr val="dk1"/>
+          </a:lnRef>
+          <a:fillRef idx="2">
+            <a:schemeClr val="dk1"/>
+          </a:fillRef>
+          <a:effectRef idx="1">
+            <a:schemeClr val="dk1"/>
+          </a:effectRef>
+          <a:fontRef idx="minor">
+            <a:schemeClr val="dk1"/>
+          </a:fontRef>
+        </p:style>
+        <p:txBody>
+          <a:bodyPr lIns="98655" tIns="49327" rIns="98655" bIns="49327">
+            <a:spAutoFit/>
+          </a:bodyPr>
+          <a:lstStyle>
+            <a:lvl1pPr defTabSz="985838" eaLnBrk="0" hangingPunct="0">
+              <a:defRPr sz="8400">
+                <a:solidFill>
+                  <a:schemeClr val="tx1"/>
+                </a:solidFill>
+                <a:latin typeface="Arial" charset="0"/>
+                <a:ea typeface="ＭＳ Ｐゴシック" charset="0"/>
+                <a:cs typeface="ＭＳ Ｐゴシック" charset="0"/>
+              </a:defRPr>
+            </a:lvl1pPr>
+            <a:lvl2pPr marL="37931725" indent="-37474525" defTabSz="985838" eaLnBrk="0" hangingPunct="0">
+              <a:defRPr sz="8400">
+                <a:solidFill>
+                  <a:schemeClr val="tx1"/>
+                </a:solidFill>
+                <a:latin typeface="Arial" charset="0"/>
+                <a:ea typeface="ＭＳ Ｐゴシック" charset="0"/>
+              </a:defRPr>
+            </a:lvl2pPr>
+            <a:lvl3pPr eaLnBrk="0" hangingPunct="0">
+              <a:defRPr sz="8400">
+                <a:solidFill>
+                  <a:schemeClr val="tx1"/>
+                </a:solidFill>
+                <a:latin typeface="Arial" charset="0"/>
+                <a:ea typeface="ＭＳ Ｐゴシック" charset="0"/>
+              </a:defRPr>
+            </a:lvl3pPr>
+            <a:lvl4pPr eaLnBrk="0" hangingPunct="0">
+              <a:defRPr sz="8400">
+                <a:solidFill>
+                  <a:schemeClr val="tx1"/>
+                </a:solidFill>
+                <a:latin typeface="Arial" charset="0"/>
+                <a:ea typeface="ＭＳ Ｐゴシック" charset="0"/>
+              </a:defRPr>
+            </a:lvl4pPr>
+            <a:lvl5pPr eaLnBrk="0" hangingPunct="0">
+              <a:defRPr sz="8400">
+                <a:solidFill>
+                  <a:schemeClr val="tx1"/>
+                </a:solidFill>
+                <a:latin typeface="Arial" charset="0"/>
+                <a:ea typeface="ＭＳ Ｐゴシック" charset="0"/>
+              </a:defRPr>
+            </a:lvl5pPr>
+            <a:lvl6pPr marL="457200" eaLnBrk="0" fontAlgn="base" hangingPunct="0">
+              <a:spcBef>
+                <a:spcPct val="0"/>
+              </a:spcBef>
+              <a:spcAft>
+                <a:spcPct val="0"/>
+              </a:spcAft>
+              <a:defRPr sz="8400">
+                <a:solidFill>
+                  <a:schemeClr val="tx1"/>
+                </a:solidFill>
+                <a:latin typeface="Arial" charset="0"/>
+                <a:ea typeface="ＭＳ Ｐゴシック" charset="0"/>
+              </a:defRPr>
+            </a:lvl6pPr>
+            <a:lvl7pPr marL="914400" eaLnBrk="0" fontAlgn="base" hangingPunct="0">
+              <a:spcBef>
+                <a:spcPct val="0"/>
+              </a:spcBef>
+              <a:spcAft>
+                <a:spcPct val="0"/>
+              </a:spcAft>
+              <a:defRPr sz="8400">
+                <a:solidFill>
+                  <a:schemeClr val="tx1"/>
+                </a:solidFill>
+                <a:latin typeface="Arial" charset="0"/>
+                <a:ea typeface="ＭＳ Ｐゴシック" charset="0"/>
+              </a:defRPr>
+            </a:lvl7pPr>
+            <a:lvl8pPr marL="1371600" eaLnBrk="0" fontAlgn="base" hangingPunct="0">
+              <a:spcBef>
+                <a:spcPct val="0"/>
+              </a:spcBef>
+              <a:spcAft>
+                <a:spcPct val="0"/>
+              </a:spcAft>
+              <a:defRPr sz="8400">
+                <a:solidFill>
+                  <a:schemeClr val="tx1"/>
+                </a:solidFill>
+                <a:latin typeface="Arial" charset="0"/>
+                <a:ea typeface="ＭＳ Ｐゴシック" charset="0"/>
+              </a:defRPr>
+            </a:lvl8pPr>
+            <a:lvl9pPr marL="1828800" eaLnBrk="0" fontAlgn="base" hangingPunct="0">
+              <a:spcBef>
+                <a:spcPct val="0"/>
+              </a:spcBef>
+              <a:spcAft>
+                <a:spcPct val="0"/>
+              </a:spcAft>
+              <a:defRPr sz="8400">
+                <a:solidFill>
+                  <a:schemeClr val="tx1"/>
+                </a:solidFill>
+                <a:latin typeface="Arial" charset="0"/>
+                <a:ea typeface="ＭＳ Ｐゴシック" charset="0"/>
+              </a:defRPr>
+            </a:lvl9pPr>
+          </a:lstStyle>
+          <a:p>
+            <a:pPr algn="ctr" eaLnBrk="1" hangingPunct="1">
+              <a:spcBef>
+                <a:spcPct val="50000"/>
+              </a:spcBef>
+            </a:pPr>
+            <a:r>
+              <a:rPr lang="en-US" sz="4100" b="1" dirty="0">
+                <a:solidFill>
+                  <a:srgbClr val="1B390A"/>
+                </a:solidFill>
+                <a:effectLst>
+                  <a:outerShdw blurRad="38100" dist="38100" dir="2700000" algn="tl">
+                    <a:srgbClr val="DDDDDD"/>
+                  </a:outerShdw>
+                </a:effectLst>
+              </a:rPr>
+              <a:t>Problem</a:t>
+            </a:r>
+          </a:p>
+        </p:txBody>
+      </p:sp>
+      <p:graphicFrame>
+        <p:nvGraphicFramePr>
+          <p:cNvPr id="24" name="Object 23"/>
+          <p:cNvGraphicFramePr>
+            <a:graphicFrameLocks noChangeAspect="1"/>
+          </p:cNvGraphicFramePr>
+          <p:nvPr>
+            <p:extLst>
+              <p:ext uri="{D42A27DB-BD31-4B8C-83A1-F6EECF244321}">
+                <p14:modId xmlns:p14="http://schemas.microsoft.com/office/powerpoint/2010/main" val="1321704127"/>
+              </p:ext>
+            </p:extLst>
+          </p:nvPr>
+        </p:nvGraphicFramePr>
+        <p:xfrm>
+          <a:off x="22338632" y="19735800"/>
+          <a:ext cx="8903368" cy="3810000"/>
+        </p:xfrm>
+        <a:graphic>
+          <a:graphicData uri="http://schemas.openxmlformats.org/presentationml/2006/ole">
+            <mc:AlternateContent xmlns:mc="http://schemas.openxmlformats.org/markup-compatibility/2006">
+              <mc:Choice xmlns:v="urn:schemas-microsoft-com:vml" Requires="v">
+                <p:oleObj spid="_x0000_s1033" name="Document" r:id="rId11" imgW="5638800" imgH="2413000" progId="Word.Document.12">
+                  <p:embed/>
+                </p:oleObj>
+              </mc:Choice>
+              <mc:Fallback>
+                <p:oleObj name="Document" r:id="rId11" imgW="5638800" imgH="2413000" progId="Word.Document.12">
+                  <p:embed/>
+                  <p:pic>
+                    <p:nvPicPr>
+                      <p:cNvPr id="0" name=""/>
+                      <p:cNvPicPr/>
+                      <p:nvPr/>
+                    </p:nvPicPr>
+                    <p:blipFill>
+                      <a:blip r:embed="rId12"/>
+                      <a:stretch>
+                        <a:fillRect/>
+                      </a:stretch>
+                    </p:blipFill>
+                    <p:spPr>
+                      <a:xfrm>
+                        <a:off x="22338632" y="19735800"/>
+                        <a:ext cx="8903368" cy="3810000"/>
+                      </a:xfrm>
+                      <a:prstGeom prst="rect">
+                        <a:avLst/>
+                      </a:prstGeom>
+                    </p:spPr>
+                  </p:pic>
+                </p:oleObj>
+              </mc:Fallback>
+            </mc:AlternateContent>
+          </a:graphicData>
+        </a:graphic>
+      </p:graphicFrame>
+      <p:pic>
+        <p:nvPicPr>
+          <p:cNvPr id="26" name="Picture 25"/>
+          <p:cNvPicPr>
+            <a:picLocks noChangeAspect="1"/>
+          </p:cNvPicPr>
+          <p:nvPr/>
+        </p:nvPicPr>
+        <p:blipFill>
+          <a:blip r:embed="rId13">
+            <a:extLst>
+              <a:ext uri="{28A0092B-C50C-407E-A947-70E740481C1C}">
+                <a14:useLocalDpi xmlns:a14="http://schemas.microsoft.com/office/drawing/2010/main" val="0"/>
+              </a:ext>
+            </a:extLst>
+          </a:blip>
+          <a:stretch>
+            <a:fillRect/>
+          </a:stretch>
+        </p:blipFill>
+        <p:spPr>
+          <a:xfrm>
+            <a:off x="26822400" y="31772845"/>
+            <a:ext cx="5006209" cy="5609461"/>
+          </a:xfrm>
+          <a:prstGeom prst="rect">
+            <a:avLst/>
+          </a:prstGeom>
+        </p:spPr>
+      </p:pic>
+      <p:pic>
+        <p:nvPicPr>
+          <p:cNvPr id="27" name="Picture 26" descr="Screen Shot 2014-12-03 at 9.38.48 PM.png"/>
+          <p:cNvPicPr>
+            <a:picLocks noChangeAspect="1"/>
+          </p:cNvPicPr>
+          <p:nvPr/>
+        </p:nvPicPr>
+        <p:blipFill>
+          <a:blip r:embed="rId14">
+            <a:extLst>
+              <a:ext uri="{28A0092B-C50C-407E-A947-70E740481C1C}">
+                <a14:useLocalDpi xmlns:a14="http://schemas.microsoft.com/office/drawing/2010/main" val="0"/>
+              </a:ext>
+            </a:extLst>
+          </a:blip>
+          <a:stretch>
+            <a:fillRect/>
+          </a:stretch>
+        </p:blipFill>
+        <p:spPr>
+          <a:xfrm>
+            <a:off x="21564600" y="31751826"/>
+            <a:ext cx="4994044" cy="5613400"/>
+          </a:xfrm>
+          <a:prstGeom prst="rect">
+            <a:avLst/>
+          </a:prstGeom>
+        </p:spPr>
+      </p:pic>
+      <p:pic>
+        <p:nvPicPr>
+          <p:cNvPr id="29" name="Picture 28" descr="EstimatedTime.png"/>
+          <p:cNvPicPr>
+            <a:picLocks noChangeAspect="1"/>
+          </p:cNvPicPr>
+          <p:nvPr/>
+        </p:nvPicPr>
+        <p:blipFill>
+          <a:blip r:embed="rId15">
+            <a:extLst>
+              <a:ext uri="{28A0092B-C50C-407E-A947-70E740481C1C}">
+                <a14:useLocalDpi xmlns:a14="http://schemas.microsoft.com/office/drawing/2010/main" val="0"/>
+              </a:ext>
+            </a:extLst>
+          </a:blip>
+          <a:stretch>
+            <a:fillRect/>
+          </a:stretch>
+        </p:blipFill>
+        <p:spPr>
+          <a:xfrm>
+            <a:off x="1752600" y="19758464"/>
+            <a:ext cx="9144000" cy="8600064"/>
+          </a:xfrm>
+          <a:prstGeom prst="rect">
+            <a:avLst/>
+          </a:prstGeom>
+        </p:spPr>
+      </p:pic>
+      <p:sp>
+        <p:nvSpPr>
+          <p:cNvPr id="30" name="Rectangle 29"/>
+          <p:cNvSpPr/>
+          <p:nvPr/>
+        </p:nvSpPr>
+        <p:spPr bwMode="auto">
+          <a:xfrm>
+            <a:off x="1371600" y="6858000"/>
+            <a:ext cx="30251400" cy="11353800"/>
+          </a:xfrm>
+          <a:prstGeom prst="rect">
+            <a:avLst/>
+          </a:prstGeom>
+          <a:solidFill>
+            <a:srgbClr val="FFFFFF"/>
+          </a:solidFill>
+          <a:ln w="9525" cap="flat" cmpd="sng" algn="ctr">
+            <a:noFill/>
+            <a:prstDash val="solid"/>
+            <a:round/>
+            <a:headEnd type="none" w="med" len="med"/>
+            <a:tailEnd type="none" w="med" len="med"/>
+          </a:ln>
+          <a:effectLst/>
+        </p:spPr>
+        <p:txBody>
+          <a:bodyPr vert="horz" wrap="square" lIns="91440" tIns="45720" rIns="91440" bIns="45720" numCol="1" rtlCol="0" anchor="t" anchorCtr="0" compatLnSpc="1">
+            <a:prstTxWarp prst="textNoShape">
+              <a:avLst/>
+            </a:prstTxWarp>
+          </a:bodyPr>
+          <a:lstStyle/>
+          <a:p>
+            <a:pPr marL="0" marR="0" indent="0" algn="l" defTabSz="4284663" rtl="0" eaLnBrk="1" fontAlgn="base" latinLnBrk="0" hangingPunct="1">
+              <a:lnSpc>
+                <a:spcPct val="100000"/>
+              </a:lnSpc>
+              <a:spcBef>
+                <a:spcPct val="0"/>
+              </a:spcBef>
+              <a:spcAft>
+                <a:spcPct val="0"/>
+              </a:spcAft>
+              <a:buClrTx/>
+              <a:buSzTx/>
+              <a:buFontTx/>
+              <a:buNone/>
+              <a:tabLst/>
+            </a:pPr>
+            <a:endParaRPr kumimoji="0" lang="en-US" sz="8400" b="0" i="0" u="none" strike="noStrike" cap="none" normalizeH="0" baseline="0" smtClean="0">
+              <a:ln>
+                <a:noFill/>
+              </a:ln>
+              <a:solidFill>
+                <a:schemeClr val="tx1"/>
+              </a:solidFill>
+              <a:effectLst/>
+              <a:latin typeface="Arial" charset="0"/>
+            </a:endParaRPr>
+          </a:p>
+        </p:txBody>
+      </p:sp>
+      <p:sp>
+        <p:nvSpPr>
           <p:cNvPr id="12" name="TextBox 11"/>
           <p:cNvSpPr txBox="1">
             <a:spLocks/>
@@ -6899,8 +6884,8 @@
         </p:nvSpPr>
         <p:spPr>
           <a:xfrm>
-            <a:off x="2590800" y="7315200"/>
-            <a:ext cx="8458200" cy="6017032"/>
+            <a:off x="2895600" y="7086600"/>
+            <a:ext cx="8077200" cy="10325904"/>
           </a:xfrm>
           <a:prstGeom prst="rect">
             <a:avLst/>
@@ -6915,9 +6900,75 @@
           <a:p>
             <a:r>
               <a:rPr lang="en-US" sz="3500" dirty="0" smtClean="0"/>
-              <a:t>The Pinecrest People Mover goes beyond the limits of a regular school bus. This trolley gives students in the Village of Pinecrest an opportunity arrive to their local middle and high school from a location close to home. However, currently there is no system that will keep track of these trolleys. Parents and students do not know how far a trolley is from their stop nor have the knowledge of the closest stop to their location.</a:t>
+              <a:t>The Pinecrest People Mover goes beyond the limits of a regular school bus. </a:t>
+            </a:r>
+            <a:endParaRPr lang="en-US" sz="3500" dirty="0" smtClean="0"/>
+          </a:p>
+          <a:p>
+            <a:pPr marL="457200" indent="-457200">
+              <a:buFont typeface="Arial"/>
+              <a:buChar char="•"/>
+            </a:pPr>
+            <a:r>
+              <a:rPr lang="en-US" sz="3500" dirty="0" smtClean="0"/>
+              <a:t>Trolley </a:t>
+            </a:r>
+            <a:r>
+              <a:rPr lang="en-US" sz="3500" dirty="0" smtClean="0"/>
+              <a:t>gives students in the Village of Pinecrest an opportunity arrive to their local middle and high school from a location close to </a:t>
+            </a:r>
+            <a:r>
+              <a:rPr lang="en-US" sz="3500" dirty="0" smtClean="0"/>
+              <a:t>home.</a:t>
+            </a:r>
+          </a:p>
+          <a:p>
+            <a:pPr marL="457200" indent="-457200">
+              <a:buFont typeface="Arial"/>
+              <a:buChar char="•"/>
+            </a:pPr>
+            <a:r>
+              <a:rPr lang="en-US" sz="3500" dirty="0"/>
+              <a:t>C</a:t>
+            </a:r>
+            <a:r>
+              <a:rPr lang="en-US" sz="3500" dirty="0" smtClean="0"/>
+              <a:t>urrently </a:t>
+            </a:r>
+            <a:r>
+              <a:rPr lang="en-US" sz="3500" dirty="0" smtClean="0"/>
+              <a:t>there is no system that will keep track of these trolleys. </a:t>
             </a:r>
             <a:endParaRPr lang="en-US" sz="3500" dirty="0"/>
+          </a:p>
+          <a:p>
+            <a:pPr marL="457200" indent="-457200">
+              <a:buFont typeface="Arial"/>
+              <a:buChar char="•"/>
+            </a:pPr>
+            <a:r>
+              <a:rPr lang="en-US" sz="3500" dirty="0" smtClean="0"/>
+              <a:t>Parents </a:t>
+            </a:r>
+            <a:r>
+              <a:rPr lang="en-US" sz="3500" dirty="0" smtClean="0"/>
+              <a:t>and students do not know how far a trolley is from their stop nor have the knowledge of the closest stop to their location</a:t>
+            </a:r>
+            <a:r>
+              <a:rPr lang="en-US" sz="3500" dirty="0" smtClean="0"/>
+              <a:t>.</a:t>
+            </a:r>
+            <a:br>
+              <a:rPr lang="en-US" sz="3500" dirty="0" smtClean="0"/>
+            </a:br>
+            <a:endParaRPr lang="en-US" sz="3500" dirty="0" smtClean="0"/>
+          </a:p>
+          <a:p>
+            <a:r>
+              <a:rPr lang="en-US" sz="3500" b="1" i="1" dirty="0" smtClean="0"/>
+              <a:t> The problem I had to tackle was to show the estimated arrival time of the bus for a particular stop, the location of the stop, and display the routes.</a:t>
+            </a:r>
+            <a:endParaRPr lang="en-US" sz="3500" b="1" i="1" dirty="0"/>
           </a:p>
         </p:txBody>
       </p:sp>
@@ -6929,8 +6980,8 @@
         </p:nvSpPr>
         <p:spPr>
           <a:xfrm>
-            <a:off x="12573000" y="7543800"/>
-            <a:ext cx="8686800" cy="3862596"/>
+            <a:off x="13030200" y="7086600"/>
+            <a:ext cx="7239000" cy="4401205"/>
           </a:xfrm>
           <a:prstGeom prst="rect">
             <a:avLst/>
@@ -6945,9 +6996,27 @@
           <a:p>
             <a:r>
               <a:rPr lang="en-US" sz="3500" dirty="0" smtClean="0"/>
-              <a:t>Currently, there are several trolley or bus trackers in Miami. However, there are no applications that focus only on the Village of Pinecrest. This application gives the user a chance to see the routes, where the stops are, the estimated time for the trolley to arrive, and set alert notifications.</a:t>
-            </a:r>
-            <a:endParaRPr lang="en-US" sz="3500" dirty="0"/>
+              <a:t>Currently, there are several trolley or bus trackers in Miami. However, there are no applications that focus only on the Village of Pinecrest. </a:t>
+            </a:r>
+            <a:r>
+              <a:rPr lang="en-US" sz="3500" dirty="0" smtClean="0"/>
+              <a:t/>
+            </a:r>
+            <a:br>
+              <a:rPr lang="en-US" sz="3500" dirty="0" smtClean="0"/>
+            </a:br>
+            <a:r>
+              <a:rPr lang="en-US" sz="3500" dirty="0" smtClean="0"/>
+              <a:t/>
+            </a:r>
+            <a:br>
+              <a:rPr lang="en-US" sz="3500" dirty="0" smtClean="0"/>
+            </a:br>
+            <a:r>
+              <a:rPr lang="en-US" sz="3500" b="1" dirty="0" smtClean="0"/>
+              <a:t>This application was made from scratch with the residents of Pinecrest in mind.</a:t>
+            </a:r>
+            <a:endParaRPr lang="en-US" sz="3500" b="1" dirty="0"/>
           </a:p>
         </p:txBody>
       </p:sp>
@@ -6959,8 +7028,8 @@
         </p:nvSpPr>
         <p:spPr>
           <a:xfrm>
-            <a:off x="22402800" y="7620000"/>
-            <a:ext cx="8534400" cy="4939814"/>
+            <a:off x="23012400" y="7086600"/>
+            <a:ext cx="7543800" cy="6017032"/>
           </a:xfrm>
           <a:prstGeom prst="rect">
             <a:avLst/>
@@ -6973,6 +7042,7 @@
           </a:bodyPr>
           <a:lstStyle/>
           <a:p>
+            <a:pPr algn="ctr"/>
             <a:r>
               <a:rPr lang="en-US" sz="3500" dirty="0" smtClean="0"/>
               <a:t>Requirements implemented per request of the client that I developed:</a:t>
@@ -6983,8 +7053,8 @@
           </a:p>
           <a:p>
             <a:pPr marL="457200" indent="-457200">
-              <a:buFont typeface="Arial"/>
-              <a:buChar char="•"/>
+              <a:buFont typeface="Wingdings" charset="2"/>
+              <a:buChar char="ü"/>
             </a:pPr>
             <a:r>
               <a:rPr lang="en-US" sz="3500" dirty="0" smtClean="0"/>
@@ -6993,8 +7063,8 @@
           </a:p>
           <a:p>
             <a:pPr marL="457200" indent="-457200">
-              <a:buFont typeface="Arial"/>
-              <a:buChar char="•"/>
+              <a:buFont typeface="Wingdings" charset="2"/>
+              <a:buChar char="ü"/>
             </a:pPr>
             <a:r>
               <a:rPr lang="en-US" sz="3500" dirty="0" smtClean="0"/>
@@ -7003,8 +7073,8 @@
           </a:p>
           <a:p>
             <a:pPr marL="457200" indent="-457200">
-              <a:buFont typeface="Arial"/>
-              <a:buChar char="•"/>
+              <a:buFont typeface="Wingdings" charset="2"/>
+              <a:buChar char="ü"/>
             </a:pPr>
             <a:r>
               <a:rPr lang="en-US" sz="3500" dirty="0" smtClean="0"/>
@@ -7013,8 +7083,8 @@
           </a:p>
           <a:p>
             <a:pPr marL="457200" indent="-457200">
-              <a:buFont typeface="Arial"/>
-              <a:buChar char="•"/>
+              <a:buFont typeface="Wingdings" charset="2"/>
+              <a:buChar char="ü"/>
             </a:pPr>
             <a:r>
               <a:rPr lang="en-US" sz="3500" dirty="0" smtClean="0"/>
@@ -7023,8 +7093,8 @@
           </a:p>
           <a:p>
             <a:pPr marL="457200" indent="-457200">
-              <a:buFont typeface="Arial"/>
-              <a:buChar char="•"/>
+              <a:buFont typeface="Wingdings" charset="2"/>
+              <a:buChar char="ü"/>
             </a:pPr>
             <a:r>
               <a:rPr lang="en-US" sz="3500" dirty="0" smtClean="0"/>
@@ -7033,27 +7103,293 @@
           </a:p>
           <a:p>
             <a:pPr marL="457200" indent="-457200">
-              <a:buFont typeface="Arial"/>
-              <a:buChar char="•"/>
+              <a:buFont typeface="Wingdings" charset="2"/>
+              <a:buChar char="ü"/>
             </a:pPr>
             <a:r>
               <a:rPr lang="en-US" sz="3500" dirty="0" smtClean="0"/>
-              <a:t>Find nearest stop for current location</a:t>
-            </a:r>
-            <a:endParaRPr lang="en-US" sz="3500" dirty="0"/>
-          </a:p>
-        </p:txBody>
-      </p:sp>
-      <p:sp>
-        <p:nvSpPr>
-          <p:cNvPr id="8" name="TextBox 7"/>
+              <a:t>Find nearest stop for current </a:t>
+            </a:r>
+            <a:r>
+              <a:rPr lang="en-US" sz="3500" dirty="0" smtClean="0"/>
+              <a:t>location</a:t>
+            </a:r>
+          </a:p>
+        </p:txBody>
+      </p:sp>
+      <p:sp>
+        <p:nvSpPr>
+          <p:cNvPr id="36" name="Text Box 19"/>
+          <p:cNvSpPr txBox="1">
+            <a:spLocks noChangeArrowheads="1"/>
+          </p:cNvSpPr>
+          <p:nvPr/>
+        </p:nvSpPr>
+        <p:spPr bwMode="auto">
+          <a:xfrm>
+            <a:off x="13639800" y="12039600"/>
+            <a:ext cx="5486400" cy="731838"/>
+          </a:xfrm>
+          <a:prstGeom prst="rect">
+            <a:avLst/>
+          </a:prstGeom>
+          <a:solidFill>
+            <a:srgbClr val="B6A674"/>
+          </a:solidFill>
+          <a:ln>
+            <a:headEnd/>
+            <a:tailEnd/>
+          </a:ln>
+        </p:spPr>
+        <p:style>
+          <a:lnRef idx="1">
+            <a:schemeClr val="dk1"/>
+          </a:lnRef>
+          <a:fillRef idx="2">
+            <a:schemeClr val="dk1"/>
+          </a:fillRef>
+          <a:effectRef idx="1">
+            <a:schemeClr val="dk1"/>
+          </a:effectRef>
+          <a:fontRef idx="minor">
+            <a:schemeClr val="dk1"/>
+          </a:fontRef>
+        </p:style>
+        <p:txBody>
+          <a:bodyPr lIns="98655" tIns="49327" rIns="98655" bIns="49327">
+            <a:spAutoFit/>
+          </a:bodyPr>
+          <a:lstStyle>
+            <a:lvl1pPr defTabSz="985838" eaLnBrk="0" hangingPunct="0">
+              <a:defRPr sz="8400">
+                <a:solidFill>
+                  <a:schemeClr val="tx1"/>
+                </a:solidFill>
+                <a:latin typeface="Arial" charset="0"/>
+                <a:ea typeface="ＭＳ Ｐゴシック" charset="0"/>
+                <a:cs typeface="ＭＳ Ｐゴシック" charset="0"/>
+              </a:defRPr>
+            </a:lvl1pPr>
+            <a:lvl2pPr marL="37931725" indent="-37474525" defTabSz="985838" eaLnBrk="0" hangingPunct="0">
+              <a:defRPr sz="8400">
+                <a:solidFill>
+                  <a:schemeClr val="tx1"/>
+                </a:solidFill>
+                <a:latin typeface="Arial" charset="0"/>
+                <a:ea typeface="ＭＳ Ｐゴシック" charset="0"/>
+              </a:defRPr>
+            </a:lvl2pPr>
+            <a:lvl3pPr eaLnBrk="0" hangingPunct="0">
+              <a:defRPr sz="8400">
+                <a:solidFill>
+                  <a:schemeClr val="tx1"/>
+                </a:solidFill>
+                <a:latin typeface="Arial" charset="0"/>
+                <a:ea typeface="ＭＳ Ｐゴシック" charset="0"/>
+              </a:defRPr>
+            </a:lvl3pPr>
+            <a:lvl4pPr eaLnBrk="0" hangingPunct="0">
+              <a:defRPr sz="8400">
+                <a:solidFill>
+                  <a:schemeClr val="tx1"/>
+                </a:solidFill>
+                <a:latin typeface="Arial" charset="0"/>
+                <a:ea typeface="ＭＳ Ｐゴシック" charset="0"/>
+              </a:defRPr>
+            </a:lvl4pPr>
+            <a:lvl5pPr eaLnBrk="0" hangingPunct="0">
+              <a:defRPr sz="8400">
+                <a:solidFill>
+                  <a:schemeClr val="tx1"/>
+                </a:solidFill>
+                <a:latin typeface="Arial" charset="0"/>
+                <a:ea typeface="ＭＳ Ｐゴシック" charset="0"/>
+              </a:defRPr>
+            </a:lvl5pPr>
+            <a:lvl6pPr marL="457200" eaLnBrk="0" fontAlgn="base" hangingPunct="0">
+              <a:spcBef>
+                <a:spcPct val="0"/>
+              </a:spcBef>
+              <a:spcAft>
+                <a:spcPct val="0"/>
+              </a:spcAft>
+              <a:defRPr sz="8400">
+                <a:solidFill>
+                  <a:schemeClr val="tx1"/>
+                </a:solidFill>
+                <a:latin typeface="Arial" charset="0"/>
+                <a:ea typeface="ＭＳ Ｐゴシック" charset="0"/>
+              </a:defRPr>
+            </a:lvl6pPr>
+            <a:lvl7pPr marL="914400" eaLnBrk="0" fontAlgn="base" hangingPunct="0">
+              <a:spcBef>
+                <a:spcPct val="0"/>
+              </a:spcBef>
+              <a:spcAft>
+                <a:spcPct val="0"/>
+              </a:spcAft>
+              <a:defRPr sz="8400">
+                <a:solidFill>
+                  <a:schemeClr val="tx1"/>
+                </a:solidFill>
+                <a:latin typeface="Arial" charset="0"/>
+                <a:ea typeface="ＭＳ Ｐゴシック" charset="0"/>
+              </a:defRPr>
+            </a:lvl7pPr>
+            <a:lvl8pPr marL="1371600" eaLnBrk="0" fontAlgn="base" hangingPunct="0">
+              <a:spcBef>
+                <a:spcPct val="0"/>
+              </a:spcBef>
+              <a:spcAft>
+                <a:spcPct val="0"/>
+              </a:spcAft>
+              <a:defRPr sz="8400">
+                <a:solidFill>
+                  <a:schemeClr val="tx1"/>
+                </a:solidFill>
+                <a:latin typeface="Arial" charset="0"/>
+                <a:ea typeface="ＭＳ Ｐゴシック" charset="0"/>
+              </a:defRPr>
+            </a:lvl8pPr>
+            <a:lvl9pPr marL="1828800" eaLnBrk="0" fontAlgn="base" hangingPunct="0">
+              <a:spcBef>
+                <a:spcPct val="0"/>
+              </a:spcBef>
+              <a:spcAft>
+                <a:spcPct val="0"/>
+              </a:spcAft>
+              <a:defRPr sz="8400">
+                <a:solidFill>
+                  <a:schemeClr val="tx1"/>
+                </a:solidFill>
+                <a:latin typeface="Arial" charset="0"/>
+                <a:ea typeface="ＭＳ Ｐゴシック" charset="0"/>
+              </a:defRPr>
+            </a:lvl9pPr>
+          </a:lstStyle>
+          <a:p>
+            <a:pPr algn="ctr" eaLnBrk="1" hangingPunct="1">
+              <a:spcBef>
+                <a:spcPct val="50000"/>
+              </a:spcBef>
+            </a:pPr>
+            <a:r>
+              <a:rPr lang="en-US" sz="4100" b="1" dirty="0">
+                <a:solidFill>
+                  <a:srgbClr val="1B390A"/>
+                </a:solidFill>
+                <a:effectLst>
+                  <a:outerShdw blurRad="38100" dist="38100" dir="2700000" algn="tl">
+                    <a:srgbClr val="DDDDDD"/>
+                  </a:outerShdw>
+                </a:effectLst>
+              </a:rPr>
+              <a:t>System Design</a:t>
+            </a:r>
+          </a:p>
+        </p:txBody>
+      </p:sp>
+      <p:pic>
+        <p:nvPicPr>
+          <p:cNvPr id="46" name="Picture 45"/>
+          <p:cNvPicPr/>
+          <p:nvPr/>
+        </p:nvPicPr>
+        <p:blipFill>
+          <a:blip r:embed="rId16">
+            <a:extLst>
+              <a:ext uri="{28A0092B-C50C-407E-A947-70E740481C1C}">
+                <a14:useLocalDpi xmlns:a14="http://schemas.microsoft.com/office/drawing/2010/main" val="0"/>
+              </a:ext>
+            </a:extLst>
+          </a:blip>
+          <a:stretch>
+            <a:fillRect/>
+          </a:stretch>
+        </p:blipFill>
+        <p:spPr>
+          <a:xfrm>
+            <a:off x="12877800" y="13106400"/>
+            <a:ext cx="7010400" cy="4191000"/>
+          </a:xfrm>
+          <a:prstGeom prst="rect">
+            <a:avLst/>
+          </a:prstGeom>
+        </p:spPr>
+      </p:pic>
+      <p:sp>
+        <p:nvSpPr>
+          <p:cNvPr id="31" name="Rectangle 30"/>
+          <p:cNvSpPr/>
+          <p:nvPr/>
+        </p:nvSpPr>
+        <p:spPr bwMode="auto">
+          <a:xfrm rot="5400000">
+            <a:off x="7429500" y="23126700"/>
+            <a:ext cx="18592800" cy="9220200"/>
+          </a:xfrm>
+          <a:prstGeom prst="rect">
+            <a:avLst/>
+          </a:prstGeom>
+          <a:solidFill>
+            <a:srgbClr val="1A3908"/>
+          </a:solidFill>
+          <a:ln w="9525" cap="flat" cmpd="sng" algn="ctr">
+            <a:noFill/>
+            <a:prstDash val="solid"/>
+            <a:round/>
+            <a:headEnd type="none" w="med" len="med"/>
+            <a:tailEnd type="none" w="med" len="med"/>
+          </a:ln>
+          <a:effectLst/>
+        </p:spPr>
+        <p:txBody>
+          <a:bodyPr vert="horz" wrap="square" lIns="91440" tIns="45720" rIns="91440" bIns="45720" numCol="1" rtlCol="0" anchor="t" anchorCtr="0" compatLnSpc="1">
+            <a:prstTxWarp prst="textNoShape">
+              <a:avLst/>
+            </a:prstTxWarp>
+          </a:bodyPr>
+          <a:lstStyle/>
+          <a:p>
+            <a:pPr marL="0" marR="0" indent="0" algn="l" defTabSz="4284663" rtl="0" eaLnBrk="1" fontAlgn="base" latinLnBrk="0" hangingPunct="1">
+              <a:lnSpc>
+                <a:spcPct val="100000"/>
+              </a:lnSpc>
+              <a:spcBef>
+                <a:spcPct val="0"/>
+              </a:spcBef>
+              <a:spcAft>
+                <a:spcPct val="0"/>
+              </a:spcAft>
+              <a:buClrTx/>
+              <a:buSzTx/>
+              <a:buFontTx/>
+              <a:buNone/>
+              <a:tabLst/>
+            </a:pPr>
+            <a:endParaRPr kumimoji="0" lang="en-US" sz="8400" b="0" i="0" u="none" strike="noStrike" cap="none" normalizeH="0" baseline="0" smtClean="0">
+              <a:ln>
+                <a:noFill/>
+              </a:ln>
+              <a:solidFill>
+                <a:schemeClr val="tx1"/>
+              </a:solidFill>
+              <a:effectLst/>
+              <a:latin typeface="Arial" charset="0"/>
+            </a:endParaRPr>
+          </a:p>
+        </p:txBody>
+      </p:sp>
+      <p:sp>
+        <p:nvSpPr>
+          <p:cNvPr id="21" name="TextBox 20"/>
           <p:cNvSpPr txBox="1"/>
           <p:nvPr/>
         </p:nvSpPr>
         <p:spPr>
           <a:xfrm>
-            <a:off x="22402800" y="30861000"/>
-            <a:ext cx="8153400" cy="5478423"/>
+            <a:off x="14554200" y="34594800"/>
+            <a:ext cx="4191000" cy="1631216"/>
           </a:xfrm>
           <a:prstGeom prst="rect">
             <a:avLst/>
@@ -7067,14 +7403,485 @@
           <a:lstStyle/>
           <a:p>
             <a:r>
-              <a:rPr lang="en-US" sz="3500" dirty="0" smtClean="0"/>
-              <a:t>After all the work that was implemented for this project, the application can now be used for tracking the Pinecrest People Mover bus. With the help of Maurice Pruna, who was mainly in charge of the back end, the application will only have a 10 second delay when information is being updated. The application can be used for both web </a:t>
-            </a:r>
-            <a:r>
-              <a:rPr lang="en-US" sz="3500" smtClean="0"/>
-              <a:t>and mobile.</a:t>
-            </a:r>
-            <a:endParaRPr lang="en-US" sz="3500" dirty="0"/>
+              <a:rPr lang="en-US" sz="2500" dirty="0" smtClean="0">
+                <a:solidFill>
+                  <a:srgbClr val="B6A674"/>
+                </a:solidFill>
+              </a:rPr>
+              <a:t>Code in the backed was done in the </a:t>
+            </a:r>
+          </a:p>
+          <a:p>
+            <a:r>
+              <a:rPr lang="en-US" sz="2500" dirty="0" smtClean="0">
+                <a:solidFill>
+                  <a:srgbClr val="B6A674"/>
+                </a:solidFill>
+              </a:rPr>
+              <a:t>Spring Tool Suite: </a:t>
+            </a:r>
+          </a:p>
+          <a:p>
+            <a:r>
+              <a:rPr lang="en-US" sz="2500" dirty="0" smtClean="0">
+                <a:solidFill>
+                  <a:srgbClr val="B6A674"/>
+                </a:solidFill>
+              </a:rPr>
+              <a:t>Estimated Time</a:t>
+            </a:r>
+            <a:endParaRPr lang="en-US" sz="2500" dirty="0">
+              <a:solidFill>
+                <a:srgbClr val="B6A674"/>
+              </a:solidFill>
+            </a:endParaRPr>
+          </a:p>
+        </p:txBody>
+      </p:sp>
+      <p:sp>
+        <p:nvSpPr>
+          <p:cNvPr id="22" name="TextBox 21"/>
+          <p:cNvSpPr txBox="1"/>
+          <p:nvPr/>
+        </p:nvSpPr>
+        <p:spPr>
+          <a:xfrm>
+            <a:off x="14859000" y="25755600"/>
+            <a:ext cx="3505200" cy="2015936"/>
+          </a:xfrm>
+          <a:prstGeom prst="rect">
+            <a:avLst/>
+          </a:prstGeom>
+          <a:noFill/>
+        </p:spPr>
+        <p:txBody>
+          <a:bodyPr wrap="square" rtlCol="0">
+            <a:spAutoFit/>
+          </a:bodyPr>
+          <a:lstStyle/>
+          <a:p>
+            <a:r>
+              <a:rPr lang="en-US" sz="2500" dirty="0" smtClean="0">
+                <a:solidFill>
+                  <a:srgbClr val="B6A674"/>
+                </a:solidFill>
+              </a:rPr>
+              <a:t>Sublime Text 2 was used to develop the </a:t>
+            </a:r>
+            <a:r>
+              <a:rPr lang="en-US" sz="2500" dirty="0">
+                <a:solidFill>
+                  <a:srgbClr val="B6A674"/>
+                </a:solidFill>
+              </a:rPr>
+              <a:t>S</a:t>
+            </a:r>
+            <a:r>
+              <a:rPr lang="en-US" sz="2500" dirty="0" smtClean="0">
+                <a:solidFill>
+                  <a:srgbClr val="B6A674"/>
+                </a:solidFill>
+              </a:rPr>
+              <a:t>encha application. Here you can see the Map Controller.</a:t>
+            </a:r>
+            <a:endParaRPr lang="en-US" sz="2500" dirty="0">
+              <a:solidFill>
+                <a:srgbClr val="B6A674"/>
+              </a:solidFill>
+            </a:endParaRPr>
+          </a:p>
+        </p:txBody>
+      </p:sp>
+      <p:pic>
+        <p:nvPicPr>
+          <p:cNvPr id="25" name="Picture 24" descr="Screen Shot 2014-12-03 at 8.28.46 PM.png"/>
+          <p:cNvPicPr>
+            <a:picLocks noChangeAspect="1"/>
+          </p:cNvPicPr>
+          <p:nvPr/>
+        </p:nvPicPr>
+        <p:blipFill>
+          <a:blip r:embed="rId17">
+            <a:extLst>
+              <a:ext uri="{28A0092B-C50C-407E-A947-70E740481C1C}">
+                <a14:useLocalDpi xmlns:a14="http://schemas.microsoft.com/office/drawing/2010/main" val="0"/>
+              </a:ext>
+            </a:extLst>
+          </a:blip>
+          <a:stretch>
+            <a:fillRect/>
+          </a:stretch>
+        </p:blipFill>
+        <p:spPr>
+          <a:xfrm>
+            <a:off x="12877800" y="19812000"/>
+            <a:ext cx="7798279" cy="5486400"/>
+          </a:xfrm>
+          <a:prstGeom prst="rect">
+            <a:avLst/>
+          </a:prstGeom>
+        </p:spPr>
+      </p:pic>
+      <p:pic>
+        <p:nvPicPr>
+          <p:cNvPr id="20" name="Picture 19" descr="Screen Shot 2014-12-03 at 8.32.26 PM.png"/>
+          <p:cNvPicPr>
+            <a:picLocks noChangeAspect="1"/>
+          </p:cNvPicPr>
+          <p:nvPr/>
+        </p:nvPicPr>
+        <p:blipFill>
+          <a:blip r:embed="rId18">
+            <a:extLst>
+              <a:ext uri="{28A0092B-C50C-407E-A947-70E740481C1C}">
+                <a14:useLocalDpi xmlns:a14="http://schemas.microsoft.com/office/drawing/2010/main" val="0"/>
+              </a:ext>
+            </a:extLst>
+          </a:blip>
+          <a:stretch>
+            <a:fillRect/>
+          </a:stretch>
+        </p:blipFill>
+        <p:spPr>
+          <a:xfrm>
+            <a:off x="13106400" y="28346400"/>
+            <a:ext cx="7230493" cy="5562600"/>
+          </a:xfrm>
+          <a:prstGeom prst="rect">
+            <a:avLst/>
+          </a:prstGeom>
+        </p:spPr>
+      </p:pic>
+      <p:sp>
+        <p:nvSpPr>
+          <p:cNvPr id="38" name="Text Box 19"/>
+          <p:cNvSpPr txBox="1">
+            <a:spLocks noChangeArrowheads="1"/>
+          </p:cNvSpPr>
+          <p:nvPr/>
+        </p:nvSpPr>
+        <p:spPr bwMode="auto">
+          <a:xfrm>
+            <a:off x="13716000" y="18669000"/>
+            <a:ext cx="5486400" cy="731838"/>
+          </a:xfrm>
+          <a:prstGeom prst="rect">
+            <a:avLst/>
+          </a:prstGeom>
+          <a:solidFill>
+            <a:srgbClr val="B6A674"/>
+          </a:solidFill>
+          <a:ln>
+            <a:headEnd/>
+            <a:tailEnd/>
+          </a:ln>
+        </p:spPr>
+        <p:style>
+          <a:lnRef idx="1">
+            <a:schemeClr val="dk1"/>
+          </a:lnRef>
+          <a:fillRef idx="2">
+            <a:schemeClr val="dk1"/>
+          </a:fillRef>
+          <a:effectRef idx="1">
+            <a:schemeClr val="dk1"/>
+          </a:effectRef>
+          <a:fontRef idx="minor">
+            <a:schemeClr val="dk1"/>
+          </a:fontRef>
+        </p:style>
+        <p:txBody>
+          <a:bodyPr lIns="98655" tIns="49327" rIns="98655" bIns="49327">
+            <a:spAutoFit/>
+          </a:bodyPr>
+          <a:lstStyle>
+            <a:lvl1pPr defTabSz="985838" eaLnBrk="0" hangingPunct="0">
+              <a:defRPr sz="8400">
+                <a:solidFill>
+                  <a:schemeClr val="tx1"/>
+                </a:solidFill>
+                <a:latin typeface="Arial" charset="0"/>
+                <a:ea typeface="ＭＳ Ｐゴシック" charset="0"/>
+                <a:cs typeface="ＭＳ Ｐゴシック" charset="0"/>
+              </a:defRPr>
+            </a:lvl1pPr>
+            <a:lvl2pPr marL="37931725" indent="-37474525" defTabSz="985838" eaLnBrk="0" hangingPunct="0">
+              <a:defRPr sz="8400">
+                <a:solidFill>
+                  <a:schemeClr val="tx1"/>
+                </a:solidFill>
+                <a:latin typeface="Arial" charset="0"/>
+                <a:ea typeface="ＭＳ Ｐゴシック" charset="0"/>
+              </a:defRPr>
+            </a:lvl2pPr>
+            <a:lvl3pPr eaLnBrk="0" hangingPunct="0">
+              <a:defRPr sz="8400">
+                <a:solidFill>
+                  <a:schemeClr val="tx1"/>
+                </a:solidFill>
+                <a:latin typeface="Arial" charset="0"/>
+                <a:ea typeface="ＭＳ Ｐゴシック" charset="0"/>
+              </a:defRPr>
+            </a:lvl3pPr>
+            <a:lvl4pPr eaLnBrk="0" hangingPunct="0">
+              <a:defRPr sz="8400">
+                <a:solidFill>
+                  <a:schemeClr val="tx1"/>
+                </a:solidFill>
+                <a:latin typeface="Arial" charset="0"/>
+                <a:ea typeface="ＭＳ Ｐゴシック" charset="0"/>
+              </a:defRPr>
+            </a:lvl4pPr>
+            <a:lvl5pPr eaLnBrk="0" hangingPunct="0">
+              <a:defRPr sz="8400">
+                <a:solidFill>
+                  <a:schemeClr val="tx1"/>
+                </a:solidFill>
+                <a:latin typeface="Arial" charset="0"/>
+                <a:ea typeface="ＭＳ Ｐゴシック" charset="0"/>
+              </a:defRPr>
+            </a:lvl5pPr>
+            <a:lvl6pPr marL="457200" eaLnBrk="0" fontAlgn="base" hangingPunct="0">
+              <a:spcBef>
+                <a:spcPct val="0"/>
+              </a:spcBef>
+              <a:spcAft>
+                <a:spcPct val="0"/>
+              </a:spcAft>
+              <a:defRPr sz="8400">
+                <a:solidFill>
+                  <a:schemeClr val="tx1"/>
+                </a:solidFill>
+                <a:latin typeface="Arial" charset="0"/>
+                <a:ea typeface="ＭＳ Ｐゴシック" charset="0"/>
+              </a:defRPr>
+            </a:lvl6pPr>
+            <a:lvl7pPr marL="914400" eaLnBrk="0" fontAlgn="base" hangingPunct="0">
+              <a:spcBef>
+                <a:spcPct val="0"/>
+              </a:spcBef>
+              <a:spcAft>
+                <a:spcPct val="0"/>
+              </a:spcAft>
+              <a:defRPr sz="8400">
+                <a:solidFill>
+                  <a:schemeClr val="tx1"/>
+                </a:solidFill>
+                <a:latin typeface="Arial" charset="0"/>
+                <a:ea typeface="ＭＳ Ｐゴシック" charset="0"/>
+              </a:defRPr>
+            </a:lvl7pPr>
+            <a:lvl8pPr marL="1371600" eaLnBrk="0" fontAlgn="base" hangingPunct="0">
+              <a:spcBef>
+                <a:spcPct val="0"/>
+              </a:spcBef>
+              <a:spcAft>
+                <a:spcPct val="0"/>
+              </a:spcAft>
+              <a:defRPr sz="8400">
+                <a:solidFill>
+                  <a:schemeClr val="tx1"/>
+                </a:solidFill>
+                <a:latin typeface="Arial" charset="0"/>
+                <a:ea typeface="ＭＳ Ｐゴシック" charset="0"/>
+              </a:defRPr>
+            </a:lvl8pPr>
+            <a:lvl9pPr marL="1828800" eaLnBrk="0" fontAlgn="base" hangingPunct="0">
+              <a:spcBef>
+                <a:spcPct val="0"/>
+              </a:spcBef>
+              <a:spcAft>
+                <a:spcPct val="0"/>
+              </a:spcAft>
+              <a:defRPr sz="8400">
+                <a:solidFill>
+                  <a:schemeClr val="tx1"/>
+                </a:solidFill>
+                <a:latin typeface="Arial" charset="0"/>
+                <a:ea typeface="ＭＳ Ｐゴシック" charset="0"/>
+              </a:defRPr>
+            </a:lvl9pPr>
+          </a:lstStyle>
+          <a:p>
+            <a:pPr algn="ctr" eaLnBrk="1" hangingPunct="1">
+              <a:spcBef>
+                <a:spcPct val="50000"/>
+              </a:spcBef>
+            </a:pPr>
+            <a:r>
+              <a:rPr lang="en-US" sz="4100" b="1" dirty="0">
+                <a:solidFill>
+                  <a:srgbClr val="1B390A"/>
+                </a:solidFill>
+                <a:effectLst>
+                  <a:outerShdw blurRad="38100" dist="38100" dir="2700000" algn="tl">
+                    <a:srgbClr val="DDDDDD"/>
+                  </a:outerShdw>
+                </a:effectLst>
+              </a:rPr>
+              <a:t>Implementation</a:t>
+            </a:r>
+          </a:p>
+        </p:txBody>
+      </p:sp>
+      <p:sp>
+        <p:nvSpPr>
+          <p:cNvPr id="14336" name="TextBox 14335"/>
+          <p:cNvSpPr txBox="1"/>
+          <p:nvPr/>
+        </p:nvSpPr>
+        <p:spPr>
+          <a:xfrm>
+            <a:off x="21488400" y="37695426"/>
+            <a:ext cx="5105400" cy="861774"/>
+          </a:xfrm>
+          <a:prstGeom prst="rect">
+            <a:avLst/>
+          </a:prstGeom>
+          <a:noFill/>
+        </p:spPr>
+        <p:txBody>
+          <a:bodyPr wrap="square" rtlCol="0">
+            <a:spAutoFit/>
+          </a:bodyPr>
+          <a:lstStyle/>
+          <a:p>
+            <a:pPr algn="ctr"/>
+            <a:r>
+              <a:rPr lang="en-US" sz="2500" dirty="0" smtClean="0"/>
+              <a:t>View when Near Me button is selected</a:t>
+            </a:r>
+            <a:endParaRPr lang="en-US" sz="2500" dirty="0"/>
+          </a:p>
+        </p:txBody>
+      </p:sp>
+      <p:sp>
+        <p:nvSpPr>
+          <p:cNvPr id="14337" name="TextBox 14336"/>
+          <p:cNvSpPr txBox="1"/>
+          <p:nvPr/>
+        </p:nvSpPr>
+        <p:spPr>
+          <a:xfrm>
+            <a:off x="26974800" y="37695426"/>
+            <a:ext cx="4800600" cy="861774"/>
+          </a:xfrm>
+          <a:prstGeom prst="rect">
+            <a:avLst/>
+          </a:prstGeom>
+          <a:noFill/>
+        </p:spPr>
+        <p:txBody>
+          <a:bodyPr wrap="square" rtlCol="0">
+            <a:spAutoFit/>
+          </a:bodyPr>
+          <a:lstStyle/>
+          <a:p>
+            <a:pPr algn="ctr"/>
+            <a:r>
+              <a:rPr lang="en-US" sz="2500" dirty="0" smtClean="0"/>
+              <a:t>Main Menu with Estimated Time functionality showing</a:t>
+            </a:r>
+            <a:endParaRPr lang="en-US" sz="2500" dirty="0"/>
+          </a:p>
+        </p:txBody>
+      </p:sp>
+      <p:sp>
+        <p:nvSpPr>
+          <p:cNvPr id="14338" name="TextBox 14337"/>
+          <p:cNvSpPr txBox="1"/>
+          <p:nvPr/>
+        </p:nvSpPr>
+        <p:spPr>
+          <a:xfrm>
+            <a:off x="20345400" y="14173200"/>
+            <a:ext cx="8610600" cy="1938992"/>
+          </a:xfrm>
+          <a:prstGeom prst="rect">
+            <a:avLst/>
+          </a:prstGeom>
+          <a:noFill/>
+        </p:spPr>
+        <p:txBody>
+          <a:bodyPr wrap="square" rtlCol="0">
+            <a:spAutoFit/>
+          </a:bodyPr>
+          <a:lstStyle/>
+          <a:p>
+            <a:r>
+              <a:rPr lang="en-US" sz="3000" dirty="0" smtClean="0"/>
+              <a:t>3-Tier Architecture</a:t>
+            </a:r>
+          </a:p>
+          <a:p>
+            <a:pPr marL="457200" indent="-457200">
+              <a:buFont typeface="Arial"/>
+              <a:buChar char="•"/>
+            </a:pPr>
+            <a:r>
+              <a:rPr lang="en-US" sz="3000" dirty="0" smtClean="0"/>
+              <a:t>Presentation Layer – </a:t>
+            </a:r>
+          </a:p>
+          <a:p>
+            <a:pPr marL="457200" indent="-457200">
+              <a:buFont typeface="Arial"/>
+              <a:buChar char="•"/>
+            </a:pPr>
+            <a:r>
+              <a:rPr lang="en-US" sz="3000" dirty="0" smtClean="0"/>
+              <a:t>Business Layer – </a:t>
+            </a:r>
+          </a:p>
+          <a:p>
+            <a:pPr marL="457200" indent="-457200">
+              <a:buFont typeface="Arial"/>
+              <a:buChar char="•"/>
+            </a:pPr>
+            <a:r>
+              <a:rPr lang="en-US" sz="3000" dirty="0" smtClean="0"/>
+              <a:t>Data Layer – </a:t>
+            </a:r>
+            <a:r>
+              <a:rPr lang="en-US" sz="3000" dirty="0" err="1" smtClean="0"/>
+              <a:t>MySql</a:t>
+            </a:r>
+            <a:r>
+              <a:rPr lang="en-US" sz="3000" dirty="0" smtClean="0"/>
+              <a:t> Database</a:t>
+            </a:r>
+            <a:endParaRPr lang="en-US" sz="3000" dirty="0"/>
+          </a:p>
+        </p:txBody>
+      </p:sp>
+      <p:sp>
+        <p:nvSpPr>
+          <p:cNvPr id="14342" name="TextBox 14341"/>
+          <p:cNvSpPr txBox="1"/>
+          <p:nvPr/>
+        </p:nvSpPr>
+        <p:spPr>
+          <a:xfrm>
+            <a:off x="1981200" y="28422600"/>
+            <a:ext cx="8686800" cy="1015663"/>
+          </a:xfrm>
+          <a:prstGeom prst="rect">
+            <a:avLst/>
+          </a:prstGeom>
+          <a:noFill/>
+        </p:spPr>
+        <p:txBody>
+          <a:bodyPr wrap="square" rtlCol="0">
+            <a:spAutoFit/>
+          </a:bodyPr>
+          <a:lstStyle/>
+          <a:p>
+            <a:pPr algn="ctr"/>
+            <a:r>
+              <a:rPr lang="en-US" sz="3000" dirty="0" smtClean="0"/>
+              <a:t>Above are the classes I implemented for the Estimated Time Functionality</a:t>
+            </a:r>
+            <a:endParaRPr lang="en-US" sz="3000" dirty="0"/>
           </a:p>
         </p:txBody>
       </p:sp>

</xml_diff>